<commit_message>
Ajuste do Desenho na V2
</commit_message>
<xml_diff>
--- a/Arquitetura_v2.pptx
+++ b/Arquitetura_v2.pptx
@@ -247,7 +247,7 @@
             <a:pPr rtl="0"/>
             <a:fld id="{572C1599-78C3-49EE-B266-57A47B9C8940}" type="datetime1">
               <a:rPr lang="pt-BR" smtClean="0"/>
-              <a:t>17/05/2023</a:t>
+              <a:t>18/05/2023</a:t>
             </a:fld>
             <a:endParaRPr lang="pt-BR" dirty="0"/>
           </a:p>
@@ -428,7 +428,7 @@
             <a:fld id="{F1238DB2-52FB-49CB-84D5-F3E8B8422193}" type="datetime1">
               <a:rPr lang="pt-BR" smtClean="0"/>
               <a:pPr/>
-              <a:t>17/05/2023</a:t>
+              <a:t>18/05/2023</a:t>
             </a:fld>
             <a:endParaRPr lang="pt-BR" dirty="0"/>
           </a:p>
@@ -16921,10 +16921,10 @@
       </p:sp>
       <p:pic>
         <p:nvPicPr>
-          <p:cNvPr id="4" name="Imagem 3">
-            <a:extLst>
-              <a:ext uri="{FF2B5EF4-FFF2-40B4-BE49-F238E27FC236}">
-                <a16:creationId xmlns:a16="http://schemas.microsoft.com/office/drawing/2014/main" id="{6C9BAF7C-D7AD-CAEE-6EC1-C50B4B146D8D}"/>
+          <p:cNvPr id="5" name="Imagem 4">
+            <a:extLst>
+              <a:ext uri="{FF2B5EF4-FFF2-40B4-BE49-F238E27FC236}">
+                <a16:creationId xmlns:a16="http://schemas.microsoft.com/office/drawing/2014/main" id="{8F4A54AA-16F0-B24C-43B4-F4E8D64CA49A}"/>
               </a:ext>
             </a:extLst>
           </p:cNvPr>
@@ -16941,17 +16941,12 @@
         </p:blipFill>
         <p:spPr>
           <a:xfrm>
-            <a:off x="1726133" y="1852612"/>
-            <a:ext cx="8524875" cy="4686300"/>
+            <a:off x="1905000" y="1832115"/>
+            <a:ext cx="8382000" cy="4572000"/>
           </a:xfrm>
           <a:prstGeom prst="rect">
             <a:avLst/>
           </a:prstGeom>
-          <a:ln>
-            <a:solidFill>
-              <a:schemeClr val="tx1"/>
-            </a:solidFill>
-          </a:ln>
         </p:spPr>
       </p:pic>
     </p:spTree>
@@ -20299,6 +20294,15 @@
 </file>
 
 <file path=customXml/item1.xml><?xml version="1.0" encoding="utf-8"?>
+<?mso-contentType ?>
+<FormTemplates xmlns="http://schemas.microsoft.com/sharepoint/v3/contenttype/forms">
+  <Display>DocumentLibraryForm</Display>
+  <Edit>DocumentLibraryForm</Edit>
+  <New>DocumentLibraryForm</New>
+</FormTemplates>
+</file>
+
+<file path=customXml/item2.xml><?xml version="1.0" encoding="utf-8"?>
 <ct:contentTypeSchema xmlns:ct="http://schemas.microsoft.com/office/2006/metadata/contentType" xmlns:ma="http://schemas.microsoft.com/office/2006/metadata/properties/metaAttributes" ct:_="" ma:_="" ma:contentTypeName="Document" ma:contentTypeID="0x01010079F111ED35F8CC479449609E8A0923A6" ma:contentTypeVersion="20" ma:contentTypeDescription="Create a new document." ma:contentTypeScope="" ma:versionID="1267097ee5f5874adfcc408041ae252e">
   <xsd:schema xmlns:xsd="http://www.w3.org/2001/XMLSchema" xmlns:xs="http://www.w3.org/2001/XMLSchema" xmlns:p="http://schemas.microsoft.com/office/2006/metadata/properties" xmlns:ns1="http://schemas.microsoft.com/sharepoint/v3" xmlns:ns2="71af3243-3dd4-4a8d-8c0d-dd76da1f02a5" xmlns:ns3="16c05727-aa75-4e4a-9b5f-8a80a1165891" xmlns:ns4="230e9df3-be65-4c73-a93b-d1236ebd677e" targetNamespace="http://schemas.microsoft.com/office/2006/metadata/properties" ma:root="true" ma:fieldsID="395891a93df65b14727750f2c06c306c" ns1:_="" ns2:_="" ns3:_="" ns4:_="">
     <xsd:import namespace="http://schemas.microsoft.com/sharepoint/v3"/>
@@ -20574,15 +20578,6 @@
 </ct:contentTypeSchema>
 </file>
 
-<file path=customXml/item2.xml><?xml version="1.0" encoding="utf-8"?>
-<?mso-contentType ?>
-<FormTemplates xmlns="http://schemas.microsoft.com/sharepoint/v3/contenttype/forms">
-  <Display>DocumentLibraryForm</Display>
-  <Edit>DocumentLibraryForm</Edit>
-  <New>DocumentLibraryForm</New>
-</FormTemplates>
-</file>
-
 <file path=customXml/item3.xml><?xml version="1.0" encoding="utf-8"?>
 <p:properties xmlns:p="http://schemas.microsoft.com/office/2006/metadata/properties" xmlns:xsi="http://www.w3.org/2001/XMLSchema-instance" xmlns:pc="http://schemas.microsoft.com/office/infopath/2007/PartnerControls">
   <documentManagement>
@@ -20603,6 +20598,14 @@
 </file>
 
 <file path=customXml/itemProps1.xml><?xml version="1.0" encoding="utf-8"?>
+<ds:datastoreItem xmlns:ds="http://schemas.openxmlformats.org/officeDocument/2006/customXml" ds:itemID="{2D446390-8521-40A2-A462-EA068123BED9}">
+  <ds:schemaRefs>
+    <ds:schemaRef ds:uri="http://schemas.microsoft.com/sharepoint/v3/contenttype/forms"/>
+  </ds:schemaRefs>
+</ds:datastoreItem>
+</file>
+
+<file path=customXml/itemProps2.xml><?xml version="1.0" encoding="utf-8"?>
 <ds:datastoreItem xmlns:ds="http://schemas.openxmlformats.org/officeDocument/2006/customXml" ds:itemID="{01E84A1C-2814-43A7-9448-348326113A45}">
   <ds:schemaRefs>
     <ds:schemaRef ds:uri="http://schemas.microsoft.com/office/2006/metadata/contentType"/>
@@ -20619,14 +20622,6 @@
     <ds:schemaRef ds:uri="http://purl.org/dc/elements/1.1/"/>
     <ds:schemaRef ds:uri="http://purl.org/dc/terms/"/>
     <ds:schemaRef ds:uri="http://schemas.microsoft.com/internal/obd"/>
-  </ds:schemaRefs>
-</ds:datastoreItem>
-</file>
-
-<file path=customXml/itemProps2.xml><?xml version="1.0" encoding="utf-8"?>
-<ds:datastoreItem xmlns:ds="http://schemas.openxmlformats.org/officeDocument/2006/customXml" ds:itemID="{2D446390-8521-40A2-A462-EA068123BED9}">
-  <ds:schemaRefs>
-    <ds:schemaRef ds:uri="http://schemas.microsoft.com/sharepoint/v3/contenttype/forms"/>
   </ds:schemaRefs>
 </ds:datastoreItem>
 </file>

</xml_diff>